<commit_message>
Working on MVP and adding devcontainer
</commit_message>
<xml_diff>
--- a/basic_example.pptx
+++ b/basic_example.pptx
@@ -7,6 +7,8 @@
   <p:sldIdLst>
     <p:sldId id="256" r:id="rId7"/>
     <p:sldId id="257" r:id="rId8"/>
+    <p:sldId id="258" r:id="rId9"/>
+    <p:sldId id="259" r:id="rId10"/>
   </p:sldIdLst>
   <p:sldSz cx="9144000" cy="6858000" type="screen4x3"/>
   <p:notesSz cx="6858000" cy="9144000"/>
@@ -3161,7 +3163,133 @@
           <a:lstStyle/>
           <a:p>
             <a:r>
-              <a:t>Test Text</a:t>
+              <a:t>Test Text Content</a:t>
+            </a:r>
+          </a:p>
+        </p:txBody>
+      </p:sp>
+      <p:sp>
+        <p:nvSpPr>
+          <p:cNvPr id="3" name="Content Placeholder 2"/>
+          <p:cNvSpPr>
+            <a:spLocks noGrp="1"/>
+          </p:cNvSpPr>
+          <p:nvPr>
+            <p:ph idx="1"/>
+          </p:nvPr>
+        </p:nvSpPr>
+        <p:spPr/>
+        <p:txBody>
+          <a:bodyPr/>
+          <a:lstStyle/>
+          <a:p>
+            <a:r>
+              <a:t>Test some text</a:t>
+            </a:r>
+          </a:p>
+        </p:txBody>
+      </p:sp>
+    </p:spTree>
+  </p:cSld>
+  <p:clrMapOvr>
+    <a:masterClrMapping/>
+  </p:clrMapOvr>
+</p:sld>
+</file>
+
+<file path=ppt/slides/slide3.xml><?xml version="1.0" encoding="utf-8"?>
+<p:sld xmlns:a="http://schemas.openxmlformats.org/drawingml/2006/main" xmlns:p="http://schemas.openxmlformats.org/presentationml/2006/main" xmlns:r="http://schemas.openxmlformats.org/officeDocument/2006/relationships">
+  <p:cSld>
+    <p:spTree>
+      <p:nvGrpSpPr>
+        <p:cNvPr id="1" name=""/>
+        <p:cNvGrpSpPr/>
+        <p:nvPr/>
+      </p:nvGrpSpPr>
+      <p:grpSpPr/>
+      <p:sp>
+        <p:nvSpPr>
+          <p:cNvPr id="2" name="Title 1"/>
+          <p:cNvSpPr>
+            <a:spLocks noGrp="1"/>
+          </p:cNvSpPr>
+          <p:nvPr>
+            <p:ph type="title"/>
+          </p:nvPr>
+        </p:nvSpPr>
+        <p:spPr/>
+        <p:txBody>
+          <a:bodyPr/>
+          <a:lstStyle/>
+          <a:p>
+            <a:r>
+              <a:t>Bulleted List Content</a:t>
+            </a:r>
+          </a:p>
+        </p:txBody>
+      </p:sp>
+      <p:sp>
+        <p:nvSpPr>
+          <p:cNvPr id="3" name="Content Placeholder 2"/>
+          <p:cNvSpPr>
+            <a:spLocks noGrp="1"/>
+          </p:cNvSpPr>
+          <p:nvPr>
+            <p:ph idx="1"/>
+          </p:nvPr>
+        </p:nvSpPr>
+        <p:spPr/>
+        <p:txBody>
+          <a:bodyPr/>
+          <a:lstStyle/>
+          <a:p>
+            <a:r>
+              <a:t>some important info</a:t>
+            </a:r>
+          </a:p>
+          <a:p>
+            <a:pPr lvl="1"/>
+            <a:r>
+              <a:t>important sub-bullet</a:t>
+            </a:r>
+          </a:p>
+        </p:txBody>
+      </p:sp>
+    </p:spTree>
+  </p:cSld>
+  <p:clrMapOvr>
+    <a:masterClrMapping/>
+  </p:clrMapOvr>
+</p:sld>
+</file>
+
+<file path=ppt/slides/slide4.xml><?xml version="1.0" encoding="utf-8"?>
+<p:sld xmlns:a="http://schemas.openxmlformats.org/drawingml/2006/main" xmlns:p="http://schemas.openxmlformats.org/presentationml/2006/main" xmlns:r="http://schemas.openxmlformats.org/officeDocument/2006/relationships">
+  <p:cSld>
+    <p:spTree>
+      <p:nvGrpSpPr>
+        <p:cNvPr id="1" name=""/>
+        <p:cNvGrpSpPr/>
+        <p:nvPr/>
+      </p:nvGrpSpPr>
+      <p:grpSpPr/>
+      <p:sp>
+        <p:nvSpPr>
+          <p:cNvPr id="2" name="Title 1"/>
+          <p:cNvSpPr>
+            <a:spLocks noGrp="1"/>
+          </p:cNvSpPr>
+          <p:nvPr>
+            <p:ph type="title"/>
+          </p:nvPr>
+        </p:nvSpPr>
+        <p:spPr/>
+        <p:txBody>
+          <a:bodyPr/>
+          <a:lstStyle/>
+          <a:p>
+            <a:r>
+              <a:t>Picture Content</a:t>
             </a:r>
           </a:p>
         </p:txBody>

</xml_diff>